<commit_message>
Updated slides and PDF with latest content.
</commit_message>
<xml_diff>
--- a/slides.pptx
+++ b/slides.pptx
@@ -9155,7 +9155,7 @@
             <a:tbl>
               <a:tblPr>
                 <a:noFill/>
-                <a:tableStyleId>{84600B35-519F-4616-B607-074E80C8BFAB}</a:tableStyleId>
+                <a:tableStyleId>{308B290A-8617-43D6-AB54-6A3C6322F276}</a:tableStyleId>
               </a:tblPr>
               <a:tblGrid>
                 <a:gridCol w="764400"/>
@@ -9850,7 +9850,7 @@
             <a:tbl>
               <a:tblPr>
                 <a:noFill/>
-                <a:tableStyleId>{84600B35-519F-4616-B607-074E80C8BFAB}</a:tableStyleId>
+                <a:tableStyleId>{308B290A-8617-43D6-AB54-6A3C6322F276}</a:tableStyleId>
               </a:tblPr>
               <a:tblGrid>
                 <a:gridCol w="394725"/>
@@ -10168,7 +10168,7 @@
             <a:tbl>
               <a:tblPr>
                 <a:noFill/>
-                <a:tableStyleId>{84600B35-519F-4616-B607-074E80C8BFAB}</a:tableStyleId>
+                <a:tableStyleId>{308B290A-8617-43D6-AB54-6A3C6322F276}</a:tableStyleId>
               </a:tblPr>
               <a:tblGrid>
                 <a:gridCol w="463500"/>
@@ -10434,7 +10434,7 @@
             <a:tbl>
               <a:tblPr>
                 <a:noFill/>
-                <a:tableStyleId>{84600B35-519F-4616-B607-074E80C8BFAB}</a:tableStyleId>
+                <a:tableStyleId>{308B290A-8617-43D6-AB54-6A3C6322F276}</a:tableStyleId>
               </a:tblPr>
               <a:tblGrid>
                 <a:gridCol w="1195950"/>
@@ -12212,7 +12212,7 @@
             <a:tbl>
               <a:tblPr>
                 <a:noFill/>
-                <a:tableStyleId>{84600B35-519F-4616-B607-074E80C8BFAB}</a:tableStyleId>
+                <a:tableStyleId>{308B290A-8617-43D6-AB54-6A3C6322F276}</a:tableStyleId>
               </a:tblPr>
               <a:tblGrid>
                 <a:gridCol w="1808500"/>
@@ -13477,7 +13477,7 @@
                 <a:cs typeface="Courier New"/>
                 <a:sym typeface="Courier New"/>
               </a:rPr>
-              <a:t>  "publisher_txt_en":"New York,",</a:t>
+              <a:t>  "publisher_s":"New York,",</a:t>
             </a:r>
             <a:endParaRPr sz="1400">
               <a:latin typeface="Courier New"/>
@@ -13507,7 +13507,7 @@
                 <a:cs typeface="Courier New"/>
                 <a:sym typeface="Courier New"/>
               </a:rPr>
-              <a:t>  "subjects_txts_en":["Geography"]</a:t>
+              <a:t>  "subjects_ss":["Geography", “Fluid mechanics”]</a:t>
             </a:r>
             <a:endParaRPr sz="1400">
               <a:latin typeface="Courier New"/>
@@ -13633,7 +13633,7 @@
           <p:nvPr/>
         </p:nvGraphicFramePr>
         <p:xfrm>
-          <a:off x="364325" y="1299964"/>
+          <a:off x="364325" y="1108293"/>
           <a:ext cx="3000000" cy="3000000"/>
         </p:xfrm>
         <a:graphic>
@@ -13641,15 +13641,15 @@
             <a:tbl>
               <a:tblPr>
                 <a:noFill/>
-                <a:tableStyleId>{84600B35-519F-4616-B607-074E80C8BFAB}</a:tableStyleId>
+                <a:tableStyleId>{308B290A-8617-43D6-AB54-6A3C6322F276}</a:tableStyleId>
               </a:tblPr>
               <a:tblGrid>
                 <a:gridCol w="1701050"/>
-                <a:gridCol w="1868675"/>
-                <a:gridCol w="2535275"/>
+                <a:gridCol w="2260900"/>
+                <a:gridCol w="2143050"/>
                 <a:gridCol w="1649775"/>
               </a:tblGrid>
-              <a:tr h="796350">
+              <a:tr h="400900">
                 <a:tc>
                   <a:txBody>
                     <a:bodyPr/>
@@ -13665,10 +13665,10 @@
                         <a:buNone/>
                       </a:pPr>
                       <a:r>
-                        <a:rPr b="1" lang="en"/>
-                        <a:t>Field in source data</a:t>
+                        <a:rPr b="1" lang="en" sz="1200"/>
+                        <a:t>Field in data</a:t>
                       </a:r>
-                      <a:endParaRPr b="1"/>
+                      <a:endParaRPr b="1" sz="1200"/>
                     </a:p>
                   </a:txBody>
                   <a:tcPr marT="91425" marB="91425" marR="91425" marL="91425"/>
@@ -13691,16 +13691,16 @@
                         <a:buNone/>
                       </a:pPr>
                       <a:r>
-                        <a:rPr b="1" lang="en">
+                        <a:rPr b="1" lang="en" sz="1200">
                           <a:solidFill>
-                            <a:schemeClr val="dk2"/>
+                            <a:schemeClr val="dk1"/>
                           </a:solidFill>
                         </a:rPr>
                         <a:t>Schema</a:t>
                       </a:r>
-                      <a:endParaRPr b="1">
+                      <a:endParaRPr b="1" sz="1200">
                         <a:solidFill>
-                          <a:schemeClr val="dk2"/>
+                          <a:schemeClr val="dk1"/>
                         </a:solidFill>
                       </a:endParaRPr>
                     </a:p>
@@ -13722,10 +13722,10 @@
                         <a:buNone/>
                       </a:pPr>
                       <a:r>
-                        <a:rPr b="1" lang="en"/>
+                        <a:rPr b="1" lang="en" sz="1200"/>
                         <a:t>Action</a:t>
                       </a:r>
-                      <a:endParaRPr b="1"/>
+                      <a:endParaRPr b="1" sz="1200"/>
                     </a:p>
                   </a:txBody>
                   <a:tcPr marT="91425" marB="91425" marR="91425" marL="91425"/>
@@ -13745,16 +13745,16 @@
                         <a:buNone/>
                       </a:pPr>
                       <a:r>
-                        <a:rPr b="1" lang="en"/>
-                        <a:t>Resulting field type</a:t>
+                        <a:rPr b="1" lang="en" sz="1200"/>
+                        <a:t>Resulting field</a:t>
                       </a:r>
-                      <a:endParaRPr b="1"/>
+                      <a:endParaRPr b="1" sz="1200"/>
                     </a:p>
                   </a:txBody>
                   <a:tcPr marT="91425" marB="91425" marR="91425" marL="91425"/>
                 </a:tc>
               </a:tr>
-              <a:tr h="396200">
+              <a:tr h="576825">
                 <a:tc>
                   <a:txBody>
                     <a:bodyPr/>
@@ -13770,7 +13770,7 @@
                         <a:buNone/>
                       </a:pPr>
                       <a:r>
-                        <a:rPr lang="en">
+                        <a:rPr lang="en" sz="1200">
                           <a:solidFill>
                             <a:schemeClr val="dk1"/>
                           </a:solidFill>
@@ -13781,7 +13781,7 @@
                         </a:rPr>
                         <a:t>id</a:t>
                       </a:r>
-                      <a:endParaRPr>
+                      <a:endParaRPr sz="1200">
                         <a:solidFill>
                           <a:schemeClr val="dk1"/>
                         </a:solidFill>
@@ -13812,7 +13812,7 @@
                         <a:buNone/>
                       </a:pPr>
                       <a:r>
-                        <a:rPr lang="en">
+                        <a:rPr lang="en" sz="1200">
                           <a:solidFill>
                             <a:schemeClr val="dk1"/>
                           </a:solidFill>
@@ -13820,7 +13820,7 @@
                         <a:t>Matches </a:t>
                       </a:r>
                       <a:r>
-                        <a:rPr lang="en">
+                        <a:rPr lang="en" sz="1200">
                           <a:solidFill>
                             <a:schemeClr val="dk1"/>
                           </a:solidFill>
@@ -13832,14 +13832,14 @@
                         <a:t>id</a:t>
                       </a:r>
                       <a:r>
-                        <a:rPr lang="en">
+                        <a:rPr lang="en" sz="1200">
                           <a:solidFill>
                             <a:schemeClr val="dk1"/>
                           </a:solidFill>
                         </a:rPr>
                         <a:t> field defined as string</a:t>
                       </a:r>
-                      <a:endParaRPr>
+                      <a:endParaRPr sz="1200">
                         <a:solidFill>
                           <a:schemeClr val="dk1"/>
                         </a:solidFill>
@@ -13863,14 +13863,14 @@
                         <a:buNone/>
                       </a:pPr>
                       <a:r>
-                        <a:rPr lang="en">
+                        <a:rPr lang="en" sz="1200">
                           <a:solidFill>
                             <a:schemeClr val="dk1"/>
                           </a:solidFill>
                         </a:rPr>
                         <a:t>Saves value</a:t>
                       </a:r>
-                      <a:endParaRPr>
+                      <a:endParaRPr sz="1200">
                         <a:solidFill>
                           <a:schemeClr val="dk1"/>
                         </a:solidFill>
@@ -13894,7 +13894,7 @@
                         <a:buNone/>
                       </a:pPr>
                       <a:r>
-                        <a:rPr lang="en">
+                        <a:rPr lang="en" sz="1200">
                           <a:solidFill>
                             <a:schemeClr val="dk1"/>
                           </a:solidFill>
@@ -13905,7 +13905,7 @@
                         </a:rPr>
                         <a:t>string</a:t>
                       </a:r>
-                      <a:endParaRPr>
+                      <a:endParaRPr sz="1200">
                         <a:solidFill>
                           <a:schemeClr val="dk1"/>
                         </a:solidFill>
@@ -13919,7 +13919,7 @@
                   <a:tcPr marT="91425" marB="91425" marR="91425" marL="91425"/>
                 </a:tc>
               </a:tr>
-              <a:tr h="641575">
+              <a:tr h="731900">
                 <a:tc>
                   <a:txBody>
                     <a:bodyPr/>
@@ -13935,7 +13935,7 @@
                         <a:buNone/>
                       </a:pPr>
                       <a:r>
-                        <a:rPr lang="en">
+                        <a:rPr lang="en" sz="1200">
                           <a:solidFill>
                             <a:schemeClr val="dk1"/>
                           </a:solidFill>
@@ -13946,7 +13946,7 @@
                         </a:rPr>
                         <a:t>author_txt_en</a:t>
                       </a:r>
-                      <a:endParaRPr>
+                      <a:endParaRPr sz="1200">
                         <a:solidFill>
                           <a:schemeClr val="dk1"/>
                         </a:solidFill>
@@ -13969,7 +13969,7 @@
                       <a:r>
                         <a:t/>
                       </a:r>
-                      <a:endParaRPr>
+                      <a:endParaRPr sz="1200">
                         <a:solidFill>
                           <a:schemeClr val="dk1"/>
                         </a:solidFill>
@@ -14000,7 +14000,7 @@
                         <a:buNone/>
                       </a:pPr>
                       <a:r>
-                        <a:rPr lang="en">
+                        <a:rPr lang="en" sz="1200">
                           <a:solidFill>
                             <a:schemeClr val="dk1"/>
                           </a:solidFill>
@@ -14008,7 +14008,7 @@
                         <a:t>Matches </a:t>
                       </a:r>
                       <a:r>
-                        <a:rPr lang="en">
+                        <a:rPr lang="en" sz="1200">
                           <a:solidFill>
                             <a:schemeClr val="dk1"/>
                           </a:solidFill>
@@ -14020,14 +14020,14 @@
                         <a:t>*_txt_en</a:t>
                       </a:r>
                       <a:r>
-                        <a:rPr lang="en">
+                        <a:rPr lang="en" sz="1200">
                           <a:solidFill>
                             <a:schemeClr val="dk1"/>
                           </a:solidFill>
                         </a:rPr>
-                        <a:t> dynamic field defined</a:t>
+                        <a:t> dynamic field</a:t>
                       </a:r>
-                      <a:endParaRPr>
+                      <a:endParaRPr sz="1200">
                         <a:solidFill>
                           <a:schemeClr val="dk1"/>
                         </a:solidFill>
@@ -14051,7 +14051,7 @@
                         <a:buNone/>
                       </a:pPr>
                       <a:r>
-                        <a:rPr lang="en">
+                        <a:rPr lang="en" sz="1200">
                           <a:solidFill>
                             <a:schemeClr val="dk1"/>
                           </a:solidFill>
@@ -14059,7 +14059,7 @@
                         <a:t>Creates field </a:t>
                       </a:r>
                       <a:r>
-                        <a:rPr lang="en">
+                        <a:rPr lang="en" sz="1200">
                           <a:solidFill>
                             <a:schemeClr val="dk1"/>
                           </a:solidFill>
@@ -14071,14 +14071,14 @@
                         <a:t>author_txt_en </a:t>
                       </a:r>
                       <a:r>
-                        <a:rPr lang="en">
+                        <a:rPr lang="en" sz="1200">
                           <a:solidFill>
                             <a:schemeClr val="dk1"/>
                           </a:solidFill>
                         </a:rPr>
                         <a:t>and saves value</a:t>
                       </a:r>
-                      <a:endParaRPr>
+                      <a:endParaRPr sz="1200">
                         <a:solidFill>
                           <a:schemeClr val="dk1"/>
                         </a:solidFill>
@@ -14102,7 +14102,7 @@
                         <a:buNone/>
                       </a:pPr>
                       <a:r>
-                        <a:rPr lang="en">
+                        <a:rPr lang="en" sz="1200">
                           <a:latin typeface="Courier New"/>
                           <a:ea typeface="Courier New"/>
                           <a:cs typeface="Courier New"/>
@@ -14110,7 +14110,7 @@
                         </a:rPr>
                         <a:t>text_en</a:t>
                       </a:r>
-                      <a:endParaRPr>
+                      <a:endParaRPr sz="1200">
                         <a:latin typeface="Courier New"/>
                         <a:ea typeface="Courier New"/>
                         <a:cs typeface="Courier New"/>
@@ -14121,7 +14121,7 @@
                   <a:tcPr marT="91425" marB="91425" marR="91425" marL="91425"/>
                 </a:tc>
               </a:tr>
-              <a:tr h="1036275">
+              <a:tr h="982800">
                 <a:tc>
                   <a:txBody>
                     <a:bodyPr/>
@@ -14137,7 +14137,7 @@
                         <a:buNone/>
                       </a:pPr>
                       <a:r>
-                        <a:rPr lang="en">
+                        <a:rPr lang="en" sz="1200">
                           <a:solidFill>
                             <a:schemeClr val="dk1"/>
                           </a:solidFill>
@@ -14148,7 +14148,7 @@
                         </a:rPr>
                         <a:t>authors_other_txts_en</a:t>
                       </a:r>
-                      <a:endParaRPr>
+                      <a:endParaRPr sz="1200">
                         <a:solidFill>
                           <a:schemeClr val="dk1"/>
                         </a:solidFill>
@@ -14179,7 +14179,7 @@
                         <a:buNone/>
                       </a:pPr>
                       <a:r>
-                        <a:rPr lang="en">
+                        <a:rPr lang="en" sz="1200">
                           <a:solidFill>
                             <a:schemeClr val="dk1"/>
                           </a:solidFill>
@@ -14187,7 +14187,7 @@
                         <a:t>Does </a:t>
                       </a:r>
                       <a:r>
-                        <a:rPr i="1" lang="en">
+                        <a:rPr i="1" lang="en" sz="1200">
                           <a:solidFill>
                             <a:schemeClr val="dk1"/>
                           </a:solidFill>
@@ -14195,14 +14195,14 @@
                         <a:t>not</a:t>
                       </a:r>
                       <a:r>
-                        <a:rPr lang="en">
+                        <a:rPr lang="en" sz="1200">
                           <a:solidFill>
                             <a:schemeClr val="dk1"/>
                           </a:solidFill>
                         </a:rPr>
-                        <a:t> match any dynamic field defined</a:t>
+                        <a:t> match any dynamic field</a:t>
                       </a:r>
-                      <a:endParaRPr>
+                      <a:endParaRPr sz="1200">
                         <a:solidFill>
                           <a:schemeClr val="dk1"/>
                         </a:solidFill>
@@ -14226,7 +14226,7 @@
                         <a:buNone/>
                       </a:pPr>
                       <a:r>
-                        <a:rPr lang="en">
+                        <a:rPr lang="en" sz="1200">
                           <a:solidFill>
                             <a:schemeClr val="dk1"/>
                           </a:solidFill>
@@ -14234,7 +14234,7 @@
                         <a:t>Creates </a:t>
                       </a:r>
                       <a:r>
-                        <a:rPr lang="en">
+                        <a:rPr lang="en" sz="1200">
                           <a:solidFill>
                             <a:schemeClr val="dk1"/>
                           </a:solidFill>
@@ -14246,7 +14246,7 @@
                         <a:t>a</a:t>
                       </a:r>
                       <a:r>
-                        <a:rPr lang="en">
+                        <a:rPr lang="en" sz="1200">
                           <a:solidFill>
                             <a:schemeClr val="dk1"/>
                           </a:solidFill>
@@ -14258,7 +14258,7 @@
                         <a:t>uthors_other_txts_en</a:t>
                       </a:r>
                       <a:r>
-                        <a:rPr lang="en">
+                        <a:rPr lang="en" sz="1200">
                           <a:solidFill>
                             <a:schemeClr val="dk1"/>
                           </a:solidFill>
@@ -14266,14 +14266,14 @@
                         <a:t> field (guesses the type), </a:t>
                       </a:r>
                       <a:r>
-                        <a:rPr lang="en">
+                        <a:rPr lang="en" sz="1200">
                           <a:solidFill>
                             <a:schemeClr val="dk1"/>
                           </a:solidFill>
                         </a:rPr>
                         <a:t>and saves value</a:t>
                       </a:r>
-                      <a:endParaRPr>
+                      <a:endParaRPr sz="1200">
                         <a:solidFill>
                           <a:schemeClr val="dk1"/>
                         </a:solidFill>
@@ -14297,7 +14297,7 @@
                         <a:buNone/>
                       </a:pPr>
                       <a:r>
-                        <a:rPr lang="en">
+                        <a:rPr lang="en" sz="1200">
                           <a:latin typeface="Courier New"/>
                           <a:ea typeface="Courier New"/>
                           <a:cs typeface="Courier New"/>
@@ -14305,7 +14305,7 @@
                         </a:rPr>
                         <a:t>text_general</a:t>
                       </a:r>
-                      <a:endParaRPr>
+                      <a:endParaRPr sz="1200">
                         <a:latin typeface="Courier New"/>
                         <a:ea typeface="Courier New"/>
                         <a:cs typeface="Courier New"/>
@@ -14316,25 +14316,42 @@
                   <a:tcPr marT="91425" marB="91425" marR="91425" marL="91425"/>
                 </a:tc>
               </a:tr>
-              <a:tr h="396200">
+              <a:tr h="570250">
                 <a:tc>
                   <a:txBody>
                     <a:bodyPr/>
                     <a:lstStyle/>
                     <a:p>
                       <a:pPr indent="0" lvl="0" marL="0" rtl="0" algn="l">
+                        <a:lnSpc>
+                          <a:spcPct val="75000"/>
+                        </a:lnSpc>
                         <a:spcBef>
                           <a:spcPts val="0"/>
                         </a:spcBef>
                         <a:spcAft>
-                          <a:spcPts val="0"/>
+                          <a:spcPts val="1200"/>
                         </a:spcAft>
+                        <a:buClr>
+                          <a:schemeClr val="dk1"/>
+                        </a:buClr>
+                        <a:buSzPts val="275"/>
+                        <a:buFont typeface="Arial"/>
                         <a:buNone/>
                       </a:pPr>
                       <a:r>
-                        <a:t/>
+                        <a:rPr lang="en" sz="1200">
+                          <a:solidFill>
+                            <a:schemeClr val="dk2"/>
+                          </a:solidFill>
+                          <a:latin typeface="Courier New"/>
+                          <a:ea typeface="Courier New"/>
+                          <a:cs typeface="Courier New"/>
+                          <a:sym typeface="Courier New"/>
+                        </a:rPr>
+                        <a:t>publisher_s</a:t>
                       </a:r>
-                      <a:endParaRPr/>
+                      <a:endParaRPr sz="1200"/>
                     </a:p>
                   </a:txBody>
                   <a:tcPr marT="91425" marB="91425" marR="91425" marL="91425"/>
@@ -14354,12 +14371,42 @@
                         <a:spcAft>
                           <a:spcPts val="1200"/>
                         </a:spcAft>
+                        <a:buClr>
+                          <a:schemeClr val="dk1"/>
+                        </a:buClr>
+                        <a:buSzPts val="1100"/>
+                        <a:buFont typeface="Arial"/>
                         <a:buNone/>
                       </a:pPr>
                       <a:r>
-                        <a:t/>
+                        <a:rPr lang="en" sz="1200">
+                          <a:solidFill>
+                            <a:schemeClr val="dk1"/>
+                          </a:solidFill>
+                        </a:rPr>
+                        <a:t>Matches </a:t>
                       </a:r>
-                      <a:endParaRPr>
+                      <a:r>
+                        <a:rPr lang="en" sz="1200">
+                          <a:solidFill>
+                            <a:schemeClr val="dk1"/>
+                          </a:solidFill>
+                          <a:latin typeface="Courier New"/>
+                          <a:ea typeface="Courier New"/>
+                          <a:cs typeface="Courier New"/>
+                          <a:sym typeface="Courier New"/>
+                        </a:rPr>
+                        <a:t>*_s</a:t>
+                      </a:r>
+                      <a:r>
+                        <a:rPr lang="en" sz="1200">
+                          <a:solidFill>
+                            <a:schemeClr val="dk1"/>
+                          </a:solidFill>
+                        </a:rPr>
+                        <a:t> dynamic field </a:t>
+                      </a:r>
+                      <a:endParaRPr sz="1200">
                         <a:solidFill>
                           <a:schemeClr val="dk2"/>
                         </a:solidFill>
@@ -14387,9 +14434,226 @@
                         <a:buNone/>
                       </a:pPr>
                       <a:r>
-                        <a:t/>
+                        <a:rPr lang="en" sz="1200"/>
+                        <a:t>Creates field </a:t>
                       </a:r>
-                      <a:endParaRPr/>
+                      <a:r>
+                        <a:rPr lang="en" sz="1200">
+                          <a:solidFill>
+                            <a:schemeClr val="dk2"/>
+                          </a:solidFill>
+                          <a:latin typeface="Courier New"/>
+                          <a:ea typeface="Courier New"/>
+                          <a:cs typeface="Courier New"/>
+                          <a:sym typeface="Courier New"/>
+                        </a:rPr>
+                        <a:t>publisher_s</a:t>
+                      </a:r>
+                      <a:endParaRPr sz="1200"/>
+                    </a:p>
+                  </a:txBody>
+                  <a:tcPr marT="91425" marB="91425" marR="91425" marL="91425"/>
+                </a:tc>
+                <a:tc>
+                  <a:txBody>
+                    <a:bodyPr/>
+                    <a:lstStyle/>
+                    <a:p>
+                      <a:pPr indent="0" lvl="0" marL="0" rtl="0" algn="l">
+                        <a:spcBef>
+                          <a:spcPts val="0"/>
+                        </a:spcBef>
+                        <a:spcAft>
+                          <a:spcPts val="0"/>
+                        </a:spcAft>
+                        <a:buClr>
+                          <a:schemeClr val="dk1"/>
+                        </a:buClr>
+                        <a:buSzPts val="1100"/>
+                        <a:buFont typeface="Arial"/>
+                        <a:buNone/>
+                      </a:pPr>
+                      <a:r>
+                        <a:rPr lang="en" sz="1200">
+                          <a:solidFill>
+                            <a:schemeClr val="dk1"/>
+                          </a:solidFill>
+                          <a:latin typeface="Courier New"/>
+                          <a:ea typeface="Courier New"/>
+                          <a:cs typeface="Courier New"/>
+                          <a:sym typeface="Courier New"/>
+                        </a:rPr>
+                        <a:t>s</a:t>
+                      </a:r>
+                      <a:r>
+                        <a:rPr lang="en" sz="1200">
+                          <a:solidFill>
+                            <a:schemeClr val="dk1"/>
+                          </a:solidFill>
+                          <a:latin typeface="Courier New"/>
+                          <a:ea typeface="Courier New"/>
+                          <a:cs typeface="Courier New"/>
+                          <a:sym typeface="Courier New"/>
+                        </a:rPr>
+                        <a:t>tring </a:t>
+                      </a:r>
+                      <a:endParaRPr sz="1200"/>
+                    </a:p>
+                  </a:txBody>
+                  <a:tcPr marT="91425" marB="91425" marR="91425" marL="91425"/>
+                </a:tc>
+              </a:tr>
+              <a:tr h="416775">
+                <a:tc>
+                  <a:txBody>
+                    <a:bodyPr/>
+                    <a:lstStyle/>
+                    <a:p>
+                      <a:pPr indent="0" lvl="0" marL="0" rtl="0" algn="l">
+                        <a:lnSpc>
+                          <a:spcPct val="75000"/>
+                        </a:lnSpc>
+                        <a:spcBef>
+                          <a:spcPts val="0"/>
+                        </a:spcBef>
+                        <a:spcAft>
+                          <a:spcPts val="1200"/>
+                        </a:spcAft>
+                        <a:buClr>
+                          <a:schemeClr val="dk1"/>
+                        </a:buClr>
+                        <a:buSzPts val="275"/>
+                        <a:buFont typeface="Arial"/>
+                        <a:buNone/>
+                      </a:pPr>
+                      <a:r>
+                        <a:rPr lang="en" sz="1200">
+                          <a:solidFill>
+                            <a:schemeClr val="dk2"/>
+                          </a:solidFill>
+                          <a:latin typeface="Courier New"/>
+                          <a:ea typeface="Courier New"/>
+                          <a:cs typeface="Courier New"/>
+                          <a:sym typeface="Courier New"/>
+                        </a:rPr>
+                        <a:t>subjects_ss</a:t>
+                      </a:r>
+                      <a:endParaRPr sz="1200">
+                        <a:solidFill>
+                          <a:schemeClr val="dk2"/>
+                        </a:solidFill>
+                        <a:latin typeface="Courier New"/>
+                        <a:ea typeface="Courier New"/>
+                        <a:cs typeface="Courier New"/>
+                        <a:sym typeface="Courier New"/>
+                      </a:endParaRPr>
+                    </a:p>
+                  </a:txBody>
+                  <a:tcPr marT="91425" marB="91425" marR="91425" marL="91425"/>
+                </a:tc>
+                <a:tc>
+                  <a:txBody>
+                    <a:bodyPr/>
+                    <a:lstStyle/>
+                    <a:p>
+                      <a:pPr indent="0" lvl="0" marL="0" rtl="0" algn="l">
+                        <a:lnSpc>
+                          <a:spcPct val="115000"/>
+                        </a:lnSpc>
+                        <a:spcBef>
+                          <a:spcPts val="0"/>
+                        </a:spcBef>
+                        <a:spcAft>
+                          <a:spcPts val="1200"/>
+                        </a:spcAft>
+                        <a:buClr>
+                          <a:schemeClr val="dk1"/>
+                        </a:buClr>
+                        <a:buSzPts val="1100"/>
+                        <a:buFont typeface="Arial"/>
+                        <a:buNone/>
+                      </a:pPr>
+                      <a:r>
+                        <a:rPr lang="en" sz="1200">
+                          <a:solidFill>
+                            <a:schemeClr val="dk1"/>
+                          </a:solidFill>
+                        </a:rPr>
+                        <a:t>Matches </a:t>
+                      </a:r>
+                      <a:r>
+                        <a:rPr lang="en" sz="1200">
+                          <a:solidFill>
+                            <a:schemeClr val="dk1"/>
+                          </a:solidFill>
+                          <a:latin typeface="Courier New"/>
+                          <a:ea typeface="Courier New"/>
+                          <a:cs typeface="Courier New"/>
+                          <a:sym typeface="Courier New"/>
+                        </a:rPr>
+                        <a:t>*_ss </a:t>
+                      </a:r>
+                      <a:r>
+                        <a:rPr lang="en" sz="1200">
+                          <a:solidFill>
+                            <a:schemeClr val="dk1"/>
+                          </a:solidFill>
+                        </a:rPr>
+                        <a:t> dynamic field</a:t>
+                      </a:r>
+                      <a:endParaRPr sz="1200">
+                        <a:solidFill>
+                          <a:schemeClr val="dk2"/>
+                        </a:solidFill>
+                        <a:latin typeface="Courier New"/>
+                        <a:ea typeface="Courier New"/>
+                        <a:cs typeface="Courier New"/>
+                        <a:sym typeface="Courier New"/>
+                      </a:endParaRPr>
+                    </a:p>
+                  </a:txBody>
+                  <a:tcPr marT="91425" marB="91425" marR="91425" marL="91425"/>
+                </a:tc>
+                <a:tc>
+                  <a:txBody>
+                    <a:bodyPr/>
+                    <a:lstStyle/>
+                    <a:p>
+                      <a:pPr indent="0" lvl="0" marL="0" rtl="0" algn="l">
+                        <a:spcBef>
+                          <a:spcPts val="0"/>
+                        </a:spcBef>
+                        <a:spcAft>
+                          <a:spcPts val="0"/>
+                        </a:spcAft>
+                        <a:buClr>
+                          <a:schemeClr val="dk1"/>
+                        </a:buClr>
+                        <a:buSzPts val="1100"/>
+                        <a:buFont typeface="Arial"/>
+                        <a:buNone/>
+                      </a:pPr>
+                      <a:r>
+                        <a:rPr lang="en" sz="1200">
+                          <a:solidFill>
+                            <a:schemeClr val="dk1"/>
+                          </a:solidFill>
+                        </a:rPr>
+                        <a:t>Creates field </a:t>
+                      </a:r>
+                      <a:r>
+                        <a:rPr lang="en" sz="1200">
+                          <a:solidFill>
+                            <a:schemeClr val="dk2"/>
+                          </a:solidFill>
+                          <a:latin typeface="Courier New"/>
+                          <a:ea typeface="Courier New"/>
+                          <a:cs typeface="Courier New"/>
+                          <a:sym typeface="Courier New"/>
+                        </a:rPr>
+                        <a:t>subjects_ss</a:t>
+                      </a:r>
+                      <a:endParaRPr sz="1200"/>
                     </a:p>
                   </a:txBody>
                   <a:tcPr marT="91425" marB="91425" marR="91425" marL="91425"/>
@@ -14409,9 +14673,34 @@
                         <a:buNone/>
                       </a:pPr>
                       <a:r>
-                        <a:t/>
+                        <a:rPr lang="en" sz="1200">
+                          <a:solidFill>
+                            <a:schemeClr val="dk1"/>
+                          </a:solidFill>
+                          <a:latin typeface="Courier New"/>
+                          <a:ea typeface="Courier New"/>
+                          <a:cs typeface="Courier New"/>
+                          <a:sym typeface="Courier New"/>
+                        </a:rPr>
+                        <a:t>S</a:t>
                       </a:r>
-                      <a:endParaRPr/>
+                      <a:r>
+                        <a:rPr lang="en" sz="1200">
+                          <a:solidFill>
+                            <a:schemeClr val="dk1"/>
+                          </a:solidFill>
+                          <a:latin typeface="Courier New"/>
+                          <a:ea typeface="Courier New"/>
+                          <a:cs typeface="Courier New"/>
+                          <a:sym typeface="Courier New"/>
+                        </a:rPr>
+                        <a:t>tring (multi-value)</a:t>
+                      </a:r>
+                      <a:r>
+                        <a:rPr lang="en" sz="1200"/>
+                        <a:t> </a:t>
+                      </a:r>
+                      <a:endParaRPr sz="1200"/>
                     </a:p>
                   </a:txBody>
                   <a:tcPr marT="91425" marB="91425" marR="91425" marL="91425"/>
@@ -14606,7 +14895,7 @@
             </a:pPr>
             <a:r>
               <a:rPr lang="en" sz="1433"/>
-              <a:t>Customizing the subject field </a:t>
+              <a:t>Customizing the subject field (optional)</a:t>
             </a:r>
             <a:endParaRPr sz="1433"/>
           </a:p>
@@ -14636,7 +14925,7 @@
             </a:r>
             <a:r>
               <a:rPr lang="en" sz="1433"/>
-              <a:t> field (copyField)</a:t>
+              <a:t> field </a:t>
             </a:r>
             <a:endParaRPr sz="1433"/>
           </a:p>
@@ -15620,23 +15909,6 @@
             <a:endParaRPr/>
           </a:p>
           <a:p>
-            <a:pPr indent="-317500" lvl="1" marL="914400" rtl="0" algn="l">
-              <a:spcBef>
-                <a:spcPts val="0"/>
-              </a:spcBef>
-              <a:spcAft>
-                <a:spcPts val="0"/>
-              </a:spcAft>
-              <a:buSzPts val="1400"/>
-              <a:buChar char="○"/>
-            </a:pPr>
-            <a:r>
-              <a:rPr lang="en"/>
-              <a:t>Good if you know what you are after</a:t>
-            </a:r>
-            <a:endParaRPr/>
-          </a:p>
-          <a:p>
             <a:pPr indent="-342900" lvl="0" marL="457200" rtl="0" algn="l">
               <a:spcBef>
                 <a:spcPts val="0"/>
@@ -16897,15 +17169,11 @@
             </a:pPr>
             <a:r>
               <a:rPr lang="en" sz="1380"/>
-              <a:t>Another product like Solr that also uses Lucene, </a:t>
+              <a:t>Another product like Solr that also uses Lucene, i</a:t>
             </a:r>
             <a:r>
               <a:rPr lang="en" sz="1380"/>
-              <a:t>not from ASF, w</a:t>
-            </a:r>
-            <a:r>
-              <a:rPr lang="en" sz="1380"/>
-              <a:t>eird licensing</a:t>
+              <a:t>ncreasingly popular</a:t>
             </a:r>
             <a:endParaRPr sz="1380"/>
           </a:p>
@@ -16925,7 +17193,11 @@
             </a:pPr>
             <a:r>
               <a:rPr lang="en" sz="1380"/>
-              <a:t>Increasingly popular</a:t>
+              <a:t>N</a:t>
+            </a:r>
+            <a:r>
+              <a:rPr lang="en" sz="1380"/>
+              <a:t>ot from ASF, weird license, not entirely open-source</a:t>
             </a:r>
             <a:endParaRPr sz="1380"/>
           </a:p>
@@ -18294,6 +18566,285 @@
 </file>
 
 <file path=ppt/theme/theme1.xml><?xml version="1.0" encoding="utf-8"?>
+<a:theme xmlns:a="http://schemas.openxmlformats.org/drawingml/2006/main" xmlns:r="http://schemas.openxmlformats.org/officeDocument/2006/relationships">
+  <a:themeElements>
+    <a:clrScheme name="Default">
+      <a:dk1>
+        <a:srgbClr val="000000"/>
+      </a:dk1>
+      <a:lt1>
+        <a:srgbClr val="FFFFFF"/>
+      </a:lt1>
+      <a:dk2>
+        <a:srgbClr val="158158"/>
+      </a:dk2>
+      <a:lt2>
+        <a:srgbClr val="F3F3F3"/>
+      </a:lt2>
+      <a:accent1>
+        <a:srgbClr val="058DC7"/>
+      </a:accent1>
+      <a:accent2>
+        <a:srgbClr val="50B432"/>
+      </a:accent2>
+      <a:accent3>
+        <a:srgbClr val="ED561B"/>
+      </a:accent3>
+      <a:accent4>
+        <a:srgbClr val="EDEF00"/>
+      </a:accent4>
+      <a:accent5>
+        <a:srgbClr val="24CBE5"/>
+      </a:accent5>
+      <a:accent6>
+        <a:srgbClr val="64E572"/>
+      </a:accent6>
+      <a:hlink>
+        <a:srgbClr val="2200CC"/>
+      </a:hlink>
+      <a:folHlink>
+        <a:srgbClr val="551A8B"/>
+      </a:folHlink>
+    </a:clrScheme>
+    <a:fontScheme name="Office">
+      <a:majorFont>
+        <a:latin typeface="Arial"/>
+        <a:ea typeface=""/>
+        <a:cs typeface=""/>
+        <a:font script="Jpan" typeface="ＭＳ Ｐゴシック"/>
+        <a:font script="Hang" typeface="맑은 고딕"/>
+        <a:font script="Hans" typeface="宋体"/>
+        <a:font script="Hant" typeface="新細明體"/>
+        <a:font script="Arab" typeface="Times New Roman"/>
+        <a:font script="Hebr" typeface="Times New Roman"/>
+        <a:font script="Thai" typeface="Angsana New"/>
+        <a:font script="Ethi" typeface="Nyala"/>
+        <a:font script="Beng" typeface="Vrinda"/>
+        <a:font script="Gujr" typeface="Shruti"/>
+        <a:font script="Khmr" typeface="MoolBoran"/>
+        <a:font script="Knda" typeface="Tunga"/>
+        <a:font script="Guru" typeface="Raavi"/>
+        <a:font script="Cans" typeface="Euphemia"/>
+        <a:font script="Cher" typeface="Plantagenet Cherokee"/>
+        <a:font script="Yiii" typeface="Microsoft Yi Baiti"/>
+        <a:font script="Tibt" typeface="Microsoft Himalaya"/>
+        <a:font script="Thaa" typeface="MV Boli"/>
+        <a:font script="Deva" typeface="Mangal"/>
+        <a:font script="Telu" typeface="Gautami"/>
+        <a:font script="Taml" typeface="Latha"/>
+        <a:font script="Syrc" typeface="Estrangelo Edessa"/>
+        <a:font script="Orya" typeface="Kalinga"/>
+        <a:font script="Mlym" typeface="Kartika"/>
+        <a:font script="Laoo" typeface="DokChampa"/>
+        <a:font script="Sinh" typeface="Iskoola Pota"/>
+        <a:font script="Mong" typeface="Mongolian Baiti"/>
+        <a:font script="Viet" typeface="Times New Roman"/>
+        <a:font script="Uigh" typeface="Microsoft Uighur"/>
+        <a:font script="Geor" typeface="Sylfaen"/>
+      </a:majorFont>
+      <a:minorFont>
+        <a:latin typeface="Arial"/>
+        <a:ea typeface=""/>
+        <a:cs typeface=""/>
+        <a:font script="Jpan" typeface="ＭＳ Ｐゴシック"/>
+        <a:font script="Hang" typeface="맑은 고딕"/>
+        <a:font script="Hans" typeface="宋体"/>
+        <a:font script="Hant" typeface="新細明體"/>
+        <a:font script="Arab" typeface="Arial"/>
+        <a:font script="Hebr" typeface="Arial"/>
+        <a:font script="Thai" typeface="Cordia New"/>
+        <a:font script="Ethi" typeface="Nyala"/>
+        <a:font script="Beng" typeface="Vrinda"/>
+        <a:font script="Gujr" typeface="Shruti"/>
+        <a:font script="Khmr" typeface="DaunPenh"/>
+        <a:font script="Knda" typeface="Tunga"/>
+        <a:font script="Guru" typeface="Raavi"/>
+        <a:font script="Cans" typeface="Euphemia"/>
+        <a:font script="Cher" typeface="Plantagenet Cherokee"/>
+        <a:font script="Yiii" typeface="Microsoft Yi Baiti"/>
+        <a:font script="Tibt" typeface="Microsoft Himalaya"/>
+        <a:font script="Thaa" typeface="MV Boli"/>
+        <a:font script="Deva" typeface="Mangal"/>
+        <a:font script="Telu" typeface="Gautami"/>
+        <a:font script="Taml" typeface="Latha"/>
+        <a:font script="Syrc" typeface="Estrangelo Edessa"/>
+        <a:font script="Orya" typeface="Kalinga"/>
+        <a:font script="Mlym" typeface="Kartika"/>
+        <a:font script="Laoo" typeface="DokChampa"/>
+        <a:font script="Sinh" typeface="Iskoola Pota"/>
+        <a:font script="Mong" typeface="Mongolian Baiti"/>
+        <a:font script="Viet" typeface="Arial"/>
+        <a:font script="Uigh" typeface="Microsoft Uighur"/>
+        <a:font script="Geor" typeface="Sylfaen"/>
+      </a:minorFont>
+    </a:fontScheme>
+    <a:fmtScheme name="Office">
+      <a:fillStyleLst>
+        <a:solidFill>
+          <a:schemeClr val="phClr"/>
+        </a:solidFill>
+        <a:gradFill rotWithShape="1">
+          <a:gsLst>
+            <a:gs pos="0">
+              <a:schemeClr val="phClr">
+                <a:tint val="50000"/>
+                <a:satMod val="300000"/>
+              </a:schemeClr>
+            </a:gs>
+            <a:gs pos="35000">
+              <a:schemeClr val="phClr">
+                <a:tint val="37000"/>
+                <a:satMod val="300000"/>
+              </a:schemeClr>
+            </a:gs>
+            <a:gs pos="100000">
+              <a:schemeClr val="phClr">
+                <a:tint val="15000"/>
+                <a:satMod val="350000"/>
+              </a:schemeClr>
+            </a:gs>
+          </a:gsLst>
+          <a:lin ang="16200000" scaled="1"/>
+        </a:gradFill>
+        <a:gradFill rotWithShape="1">
+          <a:gsLst>
+            <a:gs pos="0">
+              <a:schemeClr val="phClr">
+                <a:tint val="100000"/>
+                <a:shade val="100000"/>
+                <a:satMod val="130000"/>
+              </a:schemeClr>
+            </a:gs>
+            <a:gs pos="100000">
+              <a:schemeClr val="phClr">
+                <a:tint val="50000"/>
+                <a:shade val="100000"/>
+                <a:satMod val="350000"/>
+              </a:schemeClr>
+            </a:gs>
+          </a:gsLst>
+          <a:lin ang="16200000" scaled="0"/>
+        </a:gradFill>
+      </a:fillStyleLst>
+      <a:lnStyleLst>
+        <a:ln w="9525" cap="flat" cmpd="sng" algn="ctr">
+          <a:solidFill>
+            <a:schemeClr val="phClr">
+              <a:shade val="95000"/>
+              <a:satMod val="105000"/>
+            </a:schemeClr>
+          </a:solidFill>
+          <a:prstDash val="solid"/>
+        </a:ln>
+        <a:ln w="25400" cap="flat" cmpd="sng" algn="ctr">
+          <a:solidFill>
+            <a:schemeClr val="phClr"/>
+          </a:solidFill>
+          <a:prstDash val="solid"/>
+        </a:ln>
+        <a:ln w="38100" cap="flat" cmpd="sng" algn="ctr">
+          <a:solidFill>
+            <a:schemeClr val="phClr"/>
+          </a:solidFill>
+          <a:prstDash val="solid"/>
+        </a:ln>
+      </a:lnStyleLst>
+      <a:effectStyleLst>
+        <a:effectStyle>
+          <a:effectLst>
+            <a:outerShdw blurRad="40000" dist="20000" dir="5400000" rotWithShape="0">
+              <a:srgbClr val="000000">
+                <a:alpha val="38000"/>
+              </a:srgbClr>
+            </a:outerShdw>
+          </a:effectLst>
+        </a:effectStyle>
+        <a:effectStyle>
+          <a:effectLst>
+            <a:outerShdw blurRad="40000" dist="23000" dir="5400000" rotWithShape="0">
+              <a:srgbClr val="000000">
+                <a:alpha val="35000"/>
+              </a:srgbClr>
+            </a:outerShdw>
+          </a:effectLst>
+        </a:effectStyle>
+        <a:effectStyle>
+          <a:effectLst>
+            <a:outerShdw blurRad="40000" dist="23000" dir="5400000" rotWithShape="0">
+              <a:srgbClr val="000000">
+                <a:alpha val="35000"/>
+              </a:srgbClr>
+            </a:outerShdw>
+          </a:effectLst>
+          <a:scene3d>
+            <a:camera prst="orthographicFront">
+              <a:rot lat="0" lon="0" rev="0"/>
+            </a:camera>
+            <a:lightRig rig="threePt" dir="t">
+              <a:rot lat="0" lon="0" rev="1200000"/>
+            </a:lightRig>
+          </a:scene3d>
+          <a:sp3d>
+            <a:bevelT w="63500" h="25400"/>
+          </a:sp3d>
+        </a:effectStyle>
+      </a:effectStyleLst>
+      <a:bgFillStyleLst>
+        <a:solidFill>
+          <a:schemeClr val="phClr"/>
+        </a:solidFill>
+        <a:gradFill rotWithShape="1">
+          <a:gsLst>
+            <a:gs pos="0">
+              <a:schemeClr val="phClr">
+                <a:tint val="40000"/>
+                <a:satMod val="350000"/>
+              </a:schemeClr>
+            </a:gs>
+            <a:gs pos="40000">
+              <a:schemeClr val="phClr">
+                <a:tint val="45000"/>
+                <a:shade val="99000"/>
+                <a:satMod val="350000"/>
+              </a:schemeClr>
+            </a:gs>
+            <a:gs pos="100000">
+              <a:schemeClr val="phClr">
+                <a:shade val="20000"/>
+                <a:satMod val="255000"/>
+              </a:schemeClr>
+            </a:gs>
+          </a:gsLst>
+          <a:path path="circle">
+            <a:fillToRect l="50000" t="-80000" r="50000" b="180000"/>
+          </a:path>
+        </a:gradFill>
+        <a:gradFill rotWithShape="1">
+          <a:gsLst>
+            <a:gs pos="0">
+              <a:schemeClr val="phClr">
+                <a:tint val="80000"/>
+                <a:satMod val="300000"/>
+              </a:schemeClr>
+            </a:gs>
+            <a:gs pos="100000">
+              <a:schemeClr val="phClr">
+                <a:shade val="30000"/>
+                <a:satMod val="200000"/>
+              </a:schemeClr>
+            </a:gs>
+          </a:gsLst>
+          <a:path path="circle">
+            <a:fillToRect l="50000" t="50000" r="50000" b="50000"/>
+          </a:path>
+        </a:gradFill>
+      </a:bgFillStyleLst>
+    </a:fmtScheme>
+  </a:themeElements>
+</a:theme>
+</file>
+
+<file path=ppt/theme/theme2.xml><?xml version="1.0" encoding="utf-8"?>
 <a:theme xmlns:a="http://schemas.openxmlformats.org/drawingml/2006/main" xmlns:r="http://schemas.openxmlformats.org/officeDocument/2006/relationships" name="Simple Light">
   <a:themeElements>
     <a:clrScheme name="Simple Light">
@@ -18570,283 +19121,4 @@
     </a:fmtScheme>
   </a:themeElements>
 </a:theme>
-</file>
-
-<file path=ppt/theme/theme2.xml><?xml version="1.0" encoding="utf-8"?>
-<a:theme xmlns:a="http://schemas.openxmlformats.org/drawingml/2006/main" xmlns:r="http://schemas.openxmlformats.org/officeDocument/2006/relationships">
-  <a:themeElements>
-    <a:clrScheme name="Default">
-      <a:dk1>
-        <a:srgbClr val="000000"/>
-      </a:dk1>
-      <a:lt1>
-        <a:srgbClr val="FFFFFF"/>
-      </a:lt1>
-      <a:dk2>
-        <a:srgbClr val="158158"/>
-      </a:dk2>
-      <a:lt2>
-        <a:srgbClr val="F3F3F3"/>
-      </a:lt2>
-      <a:accent1>
-        <a:srgbClr val="058DC7"/>
-      </a:accent1>
-      <a:accent2>
-        <a:srgbClr val="50B432"/>
-      </a:accent2>
-      <a:accent3>
-        <a:srgbClr val="ED561B"/>
-      </a:accent3>
-      <a:accent4>
-        <a:srgbClr val="EDEF00"/>
-      </a:accent4>
-      <a:accent5>
-        <a:srgbClr val="24CBE5"/>
-      </a:accent5>
-      <a:accent6>
-        <a:srgbClr val="64E572"/>
-      </a:accent6>
-      <a:hlink>
-        <a:srgbClr val="2200CC"/>
-      </a:hlink>
-      <a:folHlink>
-        <a:srgbClr val="551A8B"/>
-      </a:folHlink>
-    </a:clrScheme>
-    <a:fontScheme name="Office">
-      <a:majorFont>
-        <a:latin typeface="Arial"/>
-        <a:ea typeface=""/>
-        <a:cs typeface=""/>
-        <a:font script="Jpan" typeface="ＭＳ Ｐゴシック"/>
-        <a:font script="Hang" typeface="맑은 고딕"/>
-        <a:font script="Hans" typeface="宋体"/>
-        <a:font script="Hant" typeface="新細明體"/>
-        <a:font script="Arab" typeface="Times New Roman"/>
-        <a:font script="Hebr" typeface="Times New Roman"/>
-        <a:font script="Thai" typeface="Angsana New"/>
-        <a:font script="Ethi" typeface="Nyala"/>
-        <a:font script="Beng" typeface="Vrinda"/>
-        <a:font script="Gujr" typeface="Shruti"/>
-        <a:font script="Khmr" typeface="MoolBoran"/>
-        <a:font script="Knda" typeface="Tunga"/>
-        <a:font script="Guru" typeface="Raavi"/>
-        <a:font script="Cans" typeface="Euphemia"/>
-        <a:font script="Cher" typeface="Plantagenet Cherokee"/>
-        <a:font script="Yiii" typeface="Microsoft Yi Baiti"/>
-        <a:font script="Tibt" typeface="Microsoft Himalaya"/>
-        <a:font script="Thaa" typeface="MV Boli"/>
-        <a:font script="Deva" typeface="Mangal"/>
-        <a:font script="Telu" typeface="Gautami"/>
-        <a:font script="Taml" typeface="Latha"/>
-        <a:font script="Syrc" typeface="Estrangelo Edessa"/>
-        <a:font script="Orya" typeface="Kalinga"/>
-        <a:font script="Mlym" typeface="Kartika"/>
-        <a:font script="Laoo" typeface="DokChampa"/>
-        <a:font script="Sinh" typeface="Iskoola Pota"/>
-        <a:font script="Mong" typeface="Mongolian Baiti"/>
-        <a:font script="Viet" typeface="Times New Roman"/>
-        <a:font script="Uigh" typeface="Microsoft Uighur"/>
-        <a:font script="Geor" typeface="Sylfaen"/>
-      </a:majorFont>
-      <a:minorFont>
-        <a:latin typeface="Arial"/>
-        <a:ea typeface=""/>
-        <a:cs typeface=""/>
-        <a:font script="Jpan" typeface="ＭＳ Ｐゴシック"/>
-        <a:font script="Hang" typeface="맑은 고딕"/>
-        <a:font script="Hans" typeface="宋体"/>
-        <a:font script="Hant" typeface="新細明體"/>
-        <a:font script="Arab" typeface="Arial"/>
-        <a:font script="Hebr" typeface="Arial"/>
-        <a:font script="Thai" typeface="Cordia New"/>
-        <a:font script="Ethi" typeface="Nyala"/>
-        <a:font script="Beng" typeface="Vrinda"/>
-        <a:font script="Gujr" typeface="Shruti"/>
-        <a:font script="Khmr" typeface="DaunPenh"/>
-        <a:font script="Knda" typeface="Tunga"/>
-        <a:font script="Guru" typeface="Raavi"/>
-        <a:font script="Cans" typeface="Euphemia"/>
-        <a:font script="Cher" typeface="Plantagenet Cherokee"/>
-        <a:font script="Yiii" typeface="Microsoft Yi Baiti"/>
-        <a:font script="Tibt" typeface="Microsoft Himalaya"/>
-        <a:font script="Thaa" typeface="MV Boli"/>
-        <a:font script="Deva" typeface="Mangal"/>
-        <a:font script="Telu" typeface="Gautami"/>
-        <a:font script="Taml" typeface="Latha"/>
-        <a:font script="Syrc" typeface="Estrangelo Edessa"/>
-        <a:font script="Orya" typeface="Kalinga"/>
-        <a:font script="Mlym" typeface="Kartika"/>
-        <a:font script="Laoo" typeface="DokChampa"/>
-        <a:font script="Sinh" typeface="Iskoola Pota"/>
-        <a:font script="Mong" typeface="Mongolian Baiti"/>
-        <a:font script="Viet" typeface="Arial"/>
-        <a:font script="Uigh" typeface="Microsoft Uighur"/>
-        <a:font script="Geor" typeface="Sylfaen"/>
-      </a:minorFont>
-    </a:fontScheme>
-    <a:fmtScheme name="Office">
-      <a:fillStyleLst>
-        <a:solidFill>
-          <a:schemeClr val="phClr"/>
-        </a:solidFill>
-        <a:gradFill rotWithShape="1">
-          <a:gsLst>
-            <a:gs pos="0">
-              <a:schemeClr val="phClr">
-                <a:tint val="50000"/>
-                <a:satMod val="300000"/>
-              </a:schemeClr>
-            </a:gs>
-            <a:gs pos="35000">
-              <a:schemeClr val="phClr">
-                <a:tint val="37000"/>
-                <a:satMod val="300000"/>
-              </a:schemeClr>
-            </a:gs>
-            <a:gs pos="100000">
-              <a:schemeClr val="phClr">
-                <a:tint val="15000"/>
-                <a:satMod val="350000"/>
-              </a:schemeClr>
-            </a:gs>
-          </a:gsLst>
-          <a:lin ang="16200000" scaled="1"/>
-        </a:gradFill>
-        <a:gradFill rotWithShape="1">
-          <a:gsLst>
-            <a:gs pos="0">
-              <a:schemeClr val="phClr">
-                <a:tint val="100000"/>
-                <a:shade val="100000"/>
-                <a:satMod val="130000"/>
-              </a:schemeClr>
-            </a:gs>
-            <a:gs pos="100000">
-              <a:schemeClr val="phClr">
-                <a:tint val="50000"/>
-                <a:shade val="100000"/>
-                <a:satMod val="350000"/>
-              </a:schemeClr>
-            </a:gs>
-          </a:gsLst>
-          <a:lin ang="16200000" scaled="0"/>
-        </a:gradFill>
-      </a:fillStyleLst>
-      <a:lnStyleLst>
-        <a:ln w="9525" cap="flat" cmpd="sng" algn="ctr">
-          <a:solidFill>
-            <a:schemeClr val="phClr">
-              <a:shade val="95000"/>
-              <a:satMod val="105000"/>
-            </a:schemeClr>
-          </a:solidFill>
-          <a:prstDash val="solid"/>
-        </a:ln>
-        <a:ln w="25400" cap="flat" cmpd="sng" algn="ctr">
-          <a:solidFill>
-            <a:schemeClr val="phClr"/>
-          </a:solidFill>
-          <a:prstDash val="solid"/>
-        </a:ln>
-        <a:ln w="38100" cap="flat" cmpd="sng" algn="ctr">
-          <a:solidFill>
-            <a:schemeClr val="phClr"/>
-          </a:solidFill>
-          <a:prstDash val="solid"/>
-        </a:ln>
-      </a:lnStyleLst>
-      <a:effectStyleLst>
-        <a:effectStyle>
-          <a:effectLst>
-            <a:outerShdw blurRad="40000" dist="20000" dir="5400000" rotWithShape="0">
-              <a:srgbClr val="000000">
-                <a:alpha val="38000"/>
-              </a:srgbClr>
-            </a:outerShdw>
-          </a:effectLst>
-        </a:effectStyle>
-        <a:effectStyle>
-          <a:effectLst>
-            <a:outerShdw blurRad="40000" dist="23000" dir="5400000" rotWithShape="0">
-              <a:srgbClr val="000000">
-                <a:alpha val="35000"/>
-              </a:srgbClr>
-            </a:outerShdw>
-          </a:effectLst>
-        </a:effectStyle>
-        <a:effectStyle>
-          <a:effectLst>
-            <a:outerShdw blurRad="40000" dist="23000" dir="5400000" rotWithShape="0">
-              <a:srgbClr val="000000">
-                <a:alpha val="35000"/>
-              </a:srgbClr>
-            </a:outerShdw>
-          </a:effectLst>
-          <a:scene3d>
-            <a:camera prst="orthographicFront">
-              <a:rot lat="0" lon="0" rev="0"/>
-            </a:camera>
-            <a:lightRig rig="threePt" dir="t">
-              <a:rot lat="0" lon="0" rev="1200000"/>
-            </a:lightRig>
-          </a:scene3d>
-          <a:sp3d>
-            <a:bevelT w="63500" h="25400"/>
-          </a:sp3d>
-        </a:effectStyle>
-      </a:effectStyleLst>
-      <a:bgFillStyleLst>
-        <a:solidFill>
-          <a:schemeClr val="phClr"/>
-        </a:solidFill>
-        <a:gradFill rotWithShape="1">
-          <a:gsLst>
-            <a:gs pos="0">
-              <a:schemeClr val="phClr">
-                <a:tint val="40000"/>
-                <a:satMod val="350000"/>
-              </a:schemeClr>
-            </a:gs>
-            <a:gs pos="40000">
-              <a:schemeClr val="phClr">
-                <a:tint val="45000"/>
-                <a:shade val="99000"/>
-                <a:satMod val="350000"/>
-              </a:schemeClr>
-            </a:gs>
-            <a:gs pos="100000">
-              <a:schemeClr val="phClr">
-                <a:shade val="20000"/>
-                <a:satMod val="255000"/>
-              </a:schemeClr>
-            </a:gs>
-          </a:gsLst>
-          <a:path path="circle">
-            <a:fillToRect l="50000" t="-80000" r="50000" b="180000"/>
-          </a:path>
-        </a:gradFill>
-        <a:gradFill rotWithShape="1">
-          <a:gsLst>
-            <a:gs pos="0">
-              <a:schemeClr val="phClr">
-                <a:tint val="80000"/>
-                <a:satMod val="300000"/>
-              </a:schemeClr>
-            </a:gs>
-            <a:gs pos="100000">
-              <a:schemeClr val="phClr">
-                <a:shade val="30000"/>
-                <a:satMod val="200000"/>
-              </a:schemeClr>
-            </a:gs>
-          </a:gsLst>
-          <a:path path="circle">
-            <a:fillToRect l="50000" t="50000" r="50000" b="50000"/>
-          </a:path>
-        </a:gradFill>
-      </a:bgFillStyleLst>
-    </a:fmtScheme>
-  </a:themeElements>
-</a:theme>
 </file>
</xml_diff>